<commit_message>
Màj de la présentation et intégration du mini-jeu Slurpeur au client.
</commit_message>
<xml_diff>
--- a/Présentation/Projet de semestre.pptx
+++ b/Présentation/Projet de semestre.pptx
@@ -6741,7 +6741,7 @@
       </p:pic>
       <p:pic>
         <p:nvPicPr>
-          <p:cNvPr id="4103" name="Picture 7" descr="C:\Users\Miguel\Desktop\challenger.png"/>
+          <p:cNvPr id="1026" name="Picture 2" descr="C:\Users\Miguel\Desktop\challenger.png"/>
           <p:cNvPicPr>
             <a:picLocks noChangeAspect="1" noChangeArrowheads="1"/>
           </p:cNvPicPr>
@@ -7240,15 +7240,7 @@
             </a:r>
             <a:r>
               <a:rPr lang="fr-FR" sz="2000" dirty="0" smtClean="0"/>
-              <a:t>Itération </a:t>
-            </a:r>
-            <a:r>
-              <a:rPr lang="fr-FR" sz="2000" dirty="0" smtClean="0"/>
-              <a:t>4) de </a:t>
-            </a:r>
-            <a:r>
-              <a:rPr lang="fr-FR" sz="2000" dirty="0" smtClean="0"/>
-              <a:t>3 semaines =&gt; mauvaise idée.</a:t>
+              <a:t>Itération 4) de 3 semaines =&gt; mauvaise idée.</a:t>
             </a:r>
           </a:p>
           <a:p>

</xml_diff>